<commit_message>
Initial commit, added project
</commit_message>
<xml_diff>
--- a/Banking Application Presentation.pptx
+++ b/Banking Application Presentation.pptx
@@ -5950,23 +5950,17 @@
           <a:p>
             <a:r>
               <a:rPr lang="en-US" dirty="0"/>
-              <a:t>Existing banking customers can deposit and withdraw from their checking account</a:t>
+              <a:t>Existing banking customers can deposit and withdraw from their checking accounts. </a:t>
             </a:r>
           </a:p>
           <a:p>
             <a:r>
               <a:rPr lang="en-US" dirty="0"/>
-              <a:t>Display checking account information.</a:t>
-            </a:r>
-          </a:p>
-          <a:p>
-            <a:r>
-              <a:rPr lang="en-US" dirty="0"/>
-              <a:t>Coming soon option to deposit and withdraw from their </a:t>
-            </a:r>
-            <a:r>
-              <a:rPr lang="en-US"/>
-              <a:t>savings account.</a:t>
+              <a:t>Display checking account information such as first name, last name, account number, and balance</a:t>
+            </a:r>
+            <a:r>
+              <a:rPr lang="en-US"/>
+              <a:t>. </a:t>
             </a:r>
             <a:endParaRPr lang="en-US" dirty="0"/>
           </a:p>

</xml_diff>